<commit_message>
Updated to include input/output development and screenshots.
</commit_message>
<xml_diff>
--- a/trunk/doc/Mid-Semester Progress.pptx
+++ b/trunk/doc/Mid-Semester Progress.pptx
@@ -13,6 +13,10 @@
     <p:sldId id="261" r:id="rId7"/>
     <p:sldId id="262" r:id="rId8"/>
     <p:sldId id="263" r:id="rId9"/>
+    <p:sldId id="264" r:id="rId10"/>
+    <p:sldId id="265" r:id="rId11"/>
+    <p:sldId id="266" r:id="rId12"/>
+    <p:sldId id="267" r:id="rId13"/>
   </p:sldIdLst>
   <p:sldSz cx="9144000" cy="6858000" type="screen4x3"/>
   <p:notesSz cx="6858000" cy="9144000"/>
@@ -295,7 +299,8 @@
           <a:p>
             <a:fld id="{759163FF-7771-442B-8610-97CE51D6D8C5}" type="datetimeFigureOut">
               <a:rPr lang="en-US" smtClean="0"/>
-              <a:t>3/6/2011</a:t>
+              <a:pPr/>
+              <a:t>3/7/2011</a:t>
             </a:fld>
             <a:endParaRPr lang="en-US"/>
           </a:p>
@@ -337,6 +342,7 @@
           <a:p>
             <a:fld id="{9EE4ADE1-C5B3-419B-AE44-338DA77D29B3}" type="slidenum">
               <a:rPr lang="en-US" smtClean="0"/>
+              <a:pPr/>
               <a:t>‹#›</a:t>
             </a:fld>
             <a:endParaRPr lang="en-US"/>
@@ -460,7 +466,8 @@
           <a:p>
             <a:fld id="{759163FF-7771-442B-8610-97CE51D6D8C5}" type="datetimeFigureOut">
               <a:rPr lang="en-US" smtClean="0"/>
-              <a:t>3/6/2011</a:t>
+              <a:pPr/>
+              <a:t>3/7/2011</a:t>
             </a:fld>
             <a:endParaRPr lang="en-US"/>
           </a:p>
@@ -502,6 +509,7 @@
           <a:p>
             <a:fld id="{9EE4ADE1-C5B3-419B-AE44-338DA77D29B3}" type="slidenum">
               <a:rPr lang="en-US" smtClean="0"/>
+              <a:pPr/>
               <a:t>‹#›</a:t>
             </a:fld>
             <a:endParaRPr lang="en-US"/>
@@ -635,7 +643,8 @@
           <a:p>
             <a:fld id="{759163FF-7771-442B-8610-97CE51D6D8C5}" type="datetimeFigureOut">
               <a:rPr lang="en-US" smtClean="0"/>
-              <a:t>3/6/2011</a:t>
+              <a:pPr/>
+              <a:t>3/7/2011</a:t>
             </a:fld>
             <a:endParaRPr lang="en-US"/>
           </a:p>
@@ -677,6 +686,7 @@
           <a:p>
             <a:fld id="{9EE4ADE1-C5B3-419B-AE44-338DA77D29B3}" type="slidenum">
               <a:rPr lang="en-US" smtClean="0"/>
+              <a:pPr/>
               <a:t>‹#›</a:t>
             </a:fld>
             <a:endParaRPr lang="en-US"/>
@@ -800,7 +810,8 @@
           <a:p>
             <a:fld id="{759163FF-7771-442B-8610-97CE51D6D8C5}" type="datetimeFigureOut">
               <a:rPr lang="en-US" smtClean="0"/>
-              <a:t>3/6/2011</a:t>
+              <a:pPr/>
+              <a:t>3/7/2011</a:t>
             </a:fld>
             <a:endParaRPr lang="en-US"/>
           </a:p>
@@ -842,6 +853,7 @@
           <a:p>
             <a:fld id="{9EE4ADE1-C5B3-419B-AE44-338DA77D29B3}" type="slidenum">
               <a:rPr lang="en-US" smtClean="0"/>
+              <a:pPr/>
               <a:t>‹#›</a:t>
             </a:fld>
             <a:endParaRPr lang="en-US"/>
@@ -1041,7 +1053,8 @@
           <a:p>
             <a:fld id="{759163FF-7771-442B-8610-97CE51D6D8C5}" type="datetimeFigureOut">
               <a:rPr lang="en-US" smtClean="0"/>
-              <a:t>3/6/2011</a:t>
+              <a:pPr/>
+              <a:t>3/7/2011</a:t>
             </a:fld>
             <a:endParaRPr lang="en-US"/>
           </a:p>
@@ -1083,6 +1096,7 @@
           <a:p>
             <a:fld id="{9EE4ADE1-C5B3-419B-AE44-338DA77D29B3}" type="slidenum">
               <a:rPr lang="en-US" smtClean="0"/>
+              <a:pPr/>
               <a:t>‹#›</a:t>
             </a:fld>
             <a:endParaRPr lang="en-US"/>
@@ -1324,7 +1338,8 @@
           <a:p>
             <a:fld id="{759163FF-7771-442B-8610-97CE51D6D8C5}" type="datetimeFigureOut">
               <a:rPr lang="en-US" smtClean="0"/>
-              <a:t>3/6/2011</a:t>
+              <a:pPr/>
+              <a:t>3/7/2011</a:t>
             </a:fld>
             <a:endParaRPr lang="en-US"/>
           </a:p>
@@ -1366,6 +1381,7 @@
           <a:p>
             <a:fld id="{9EE4ADE1-C5B3-419B-AE44-338DA77D29B3}" type="slidenum">
               <a:rPr lang="en-US" smtClean="0"/>
+              <a:pPr/>
               <a:t>‹#›</a:t>
             </a:fld>
             <a:endParaRPr lang="en-US"/>
@@ -1741,7 +1757,8 @@
           <a:p>
             <a:fld id="{759163FF-7771-442B-8610-97CE51D6D8C5}" type="datetimeFigureOut">
               <a:rPr lang="en-US" smtClean="0"/>
-              <a:t>3/6/2011</a:t>
+              <a:pPr/>
+              <a:t>3/7/2011</a:t>
             </a:fld>
             <a:endParaRPr lang="en-US"/>
           </a:p>
@@ -1783,6 +1800,7 @@
           <a:p>
             <a:fld id="{9EE4ADE1-C5B3-419B-AE44-338DA77D29B3}" type="slidenum">
               <a:rPr lang="en-US" smtClean="0"/>
+              <a:pPr/>
               <a:t>‹#›</a:t>
             </a:fld>
             <a:endParaRPr lang="en-US"/>
@@ -1854,7 +1872,8 @@
           <a:p>
             <a:fld id="{759163FF-7771-442B-8610-97CE51D6D8C5}" type="datetimeFigureOut">
               <a:rPr lang="en-US" smtClean="0"/>
-              <a:t>3/6/2011</a:t>
+              <a:pPr/>
+              <a:t>3/7/2011</a:t>
             </a:fld>
             <a:endParaRPr lang="en-US"/>
           </a:p>
@@ -1896,6 +1915,7 @@
           <a:p>
             <a:fld id="{9EE4ADE1-C5B3-419B-AE44-338DA77D29B3}" type="slidenum">
               <a:rPr lang="en-US" smtClean="0"/>
+              <a:pPr/>
               <a:t>‹#›</a:t>
             </a:fld>
             <a:endParaRPr lang="en-US"/>
@@ -1944,7 +1964,8 @@
           <a:p>
             <a:fld id="{759163FF-7771-442B-8610-97CE51D6D8C5}" type="datetimeFigureOut">
               <a:rPr lang="en-US" smtClean="0"/>
-              <a:t>3/6/2011</a:t>
+              <a:pPr/>
+              <a:t>3/7/2011</a:t>
             </a:fld>
             <a:endParaRPr lang="en-US"/>
           </a:p>
@@ -1986,6 +2007,7 @@
           <a:p>
             <a:fld id="{9EE4ADE1-C5B3-419B-AE44-338DA77D29B3}" type="slidenum">
               <a:rPr lang="en-US" smtClean="0"/>
+              <a:pPr/>
               <a:t>‹#›</a:t>
             </a:fld>
             <a:endParaRPr lang="en-US"/>
@@ -2216,7 +2238,8 @@
           <a:p>
             <a:fld id="{759163FF-7771-442B-8610-97CE51D6D8C5}" type="datetimeFigureOut">
               <a:rPr lang="en-US" smtClean="0"/>
-              <a:t>3/6/2011</a:t>
+              <a:pPr/>
+              <a:t>3/7/2011</a:t>
             </a:fld>
             <a:endParaRPr lang="en-US"/>
           </a:p>
@@ -2258,6 +2281,7 @@
           <a:p>
             <a:fld id="{9EE4ADE1-C5B3-419B-AE44-338DA77D29B3}" type="slidenum">
               <a:rPr lang="en-US" smtClean="0"/>
+              <a:pPr/>
               <a:t>‹#›</a:t>
             </a:fld>
             <a:endParaRPr lang="en-US"/>
@@ -2464,7 +2488,8 @@
           <a:p>
             <a:fld id="{759163FF-7771-442B-8610-97CE51D6D8C5}" type="datetimeFigureOut">
               <a:rPr lang="en-US" smtClean="0"/>
-              <a:t>3/6/2011</a:t>
+              <a:pPr/>
+              <a:t>3/7/2011</a:t>
             </a:fld>
             <a:endParaRPr lang="en-US"/>
           </a:p>
@@ -2506,6 +2531,7 @@
           <a:p>
             <a:fld id="{9EE4ADE1-C5B3-419B-AE44-338DA77D29B3}" type="slidenum">
               <a:rPr lang="en-US" smtClean="0"/>
+              <a:pPr/>
               <a:t>‹#›</a:t>
             </a:fld>
             <a:endParaRPr lang="en-US"/>
@@ -2672,7 +2698,8 @@
           <a:p>
             <a:fld id="{759163FF-7771-442B-8610-97CE51D6D8C5}" type="datetimeFigureOut">
               <a:rPr lang="en-US" smtClean="0"/>
-              <a:t>3/6/2011</a:t>
+              <a:pPr/>
+              <a:t>3/7/2011</a:t>
             </a:fld>
             <a:endParaRPr lang="en-US"/>
           </a:p>
@@ -2750,6 +2777,7 @@
           <a:p>
             <a:fld id="{9EE4ADE1-C5B3-419B-AE44-338DA77D29B3}" type="slidenum">
               <a:rPr lang="en-US" smtClean="0"/>
+              <a:pPr/>
               <a:t>‹#›</a:t>
             </a:fld>
             <a:endParaRPr lang="en-US"/>
@@ -3092,6 +3120,243 @@
 </p:sld>
 </file>
 
+<file path=ppt/slides/slide10.xml><?xml version="1.0" encoding="utf-8"?>
+<p:sld xmlns:a="http://schemas.openxmlformats.org/drawingml/2006/main" xmlns:r="http://schemas.openxmlformats.org/officeDocument/2006/relationships" xmlns:p="http://schemas.openxmlformats.org/presentationml/2006/main">
+  <p:cSld>
+    <p:spTree>
+      <p:nvGrpSpPr>
+        <p:cNvPr id="1" name=""/>
+        <p:cNvGrpSpPr/>
+        <p:nvPr/>
+      </p:nvGrpSpPr>
+      <p:grpSpPr>
+        <a:xfrm>
+          <a:off x="0" y="0"/>
+          <a:ext cx="0" cy="0"/>
+          <a:chOff x="0" y="0"/>
+          <a:chExt cx="0" cy="0"/>
+        </a:xfrm>
+      </p:grpSpPr>
+      <p:sp>
+        <p:nvSpPr>
+          <p:cNvPr id="2" name="Title 1"/>
+          <p:cNvSpPr>
+            <a:spLocks noGrp="1"/>
+          </p:cNvSpPr>
+          <p:nvPr>
+            <p:ph type="title"/>
+          </p:nvPr>
+        </p:nvSpPr>
+        <p:spPr/>
+        <p:txBody>
+          <a:bodyPr/>
+          <a:lstStyle/>
+          <a:p>
+            <a:r>
+              <a:rPr lang="en-US" dirty="0" smtClean="0"/>
+              <a:t>Screenshots</a:t>
+            </a:r>
+            <a:endParaRPr lang="en-US" dirty="0"/>
+          </a:p>
+        </p:txBody>
+      </p:sp>
+      <p:pic>
+        <p:nvPicPr>
+          <p:cNvPr id="4" name="Content Placeholder 3" descr="Player.png"/>
+          <p:cNvPicPr>
+            <a:picLocks noGrp="1" noChangeAspect="1"/>
+          </p:cNvPicPr>
+          <p:nvPr>
+            <p:ph idx="1"/>
+          </p:nvPr>
+        </p:nvPicPr>
+        <p:blipFill>
+          <a:blip r:embed="rId2"/>
+          <a:stretch>
+            <a:fillRect/>
+          </a:stretch>
+        </p:blipFill>
+        <p:spPr>
+          <a:xfrm>
+            <a:off x="1517200" y="1600200"/>
+            <a:ext cx="6109600" cy="4525963"/>
+          </a:xfrm>
+        </p:spPr>
+      </p:pic>
+    </p:spTree>
+  </p:cSld>
+  <p:clrMapOvr>
+    <a:masterClrMapping/>
+  </p:clrMapOvr>
+</p:sld>
+</file>
+
+<file path=ppt/slides/slide11.xml><?xml version="1.0" encoding="utf-8"?>
+<p:sld xmlns:a="http://schemas.openxmlformats.org/drawingml/2006/main" xmlns:r="http://schemas.openxmlformats.org/officeDocument/2006/relationships" xmlns:p="http://schemas.openxmlformats.org/presentationml/2006/main">
+  <p:cSld>
+    <p:spTree>
+      <p:nvGrpSpPr>
+        <p:cNvPr id="1" name=""/>
+        <p:cNvGrpSpPr/>
+        <p:nvPr/>
+      </p:nvGrpSpPr>
+      <p:grpSpPr>
+        <a:xfrm>
+          <a:off x="0" y="0"/>
+          <a:ext cx="0" cy="0"/>
+          <a:chOff x="0" y="0"/>
+          <a:chExt cx="0" cy="0"/>
+        </a:xfrm>
+      </p:grpSpPr>
+      <p:sp>
+        <p:nvSpPr>
+          <p:cNvPr id="2" name="Title 1"/>
+          <p:cNvSpPr>
+            <a:spLocks noGrp="1"/>
+          </p:cNvSpPr>
+          <p:nvPr>
+            <p:ph type="title"/>
+          </p:nvPr>
+        </p:nvSpPr>
+        <p:spPr/>
+        <p:txBody>
+          <a:bodyPr/>
+          <a:lstStyle/>
+          <a:p>
+            <a:r>
+              <a:rPr lang="en-US" dirty="0" smtClean="0"/>
+              <a:t>Screenshots</a:t>
+            </a:r>
+            <a:endParaRPr lang="en-US" dirty="0"/>
+          </a:p>
+        </p:txBody>
+      </p:sp>
+      <p:pic>
+        <p:nvPicPr>
+          <p:cNvPr id="1026" name="Picture 2"/>
+          <p:cNvPicPr>
+            <a:picLocks noGrp="1" noChangeAspect="1" noChangeArrowheads="1"/>
+          </p:cNvPicPr>
+          <p:nvPr>
+            <p:ph idx="1"/>
+          </p:nvPr>
+        </p:nvPicPr>
+        <p:blipFill>
+          <a:blip r:embed="rId2"/>
+          <a:srcRect/>
+          <a:stretch>
+            <a:fillRect/>
+          </a:stretch>
+        </p:blipFill>
+        <p:spPr bwMode="auto">
+          <a:xfrm>
+            <a:off x="1517200" y="1600200"/>
+            <a:ext cx="6109600" cy="4525963"/>
+          </a:xfrm>
+          <a:prstGeom prst="rect">
+            <a:avLst/>
+          </a:prstGeom>
+          <a:noFill/>
+          <a:ln w="9525">
+            <a:noFill/>
+            <a:miter lim="800000"/>
+            <a:headEnd/>
+            <a:tailEnd/>
+          </a:ln>
+          <a:effectLst/>
+        </p:spPr>
+      </p:pic>
+    </p:spTree>
+  </p:cSld>
+  <p:clrMapOvr>
+    <a:masterClrMapping/>
+  </p:clrMapOvr>
+</p:sld>
+</file>
+
+<file path=ppt/slides/slide12.xml><?xml version="1.0" encoding="utf-8"?>
+<p:sld xmlns:a="http://schemas.openxmlformats.org/drawingml/2006/main" xmlns:r="http://schemas.openxmlformats.org/officeDocument/2006/relationships" xmlns:p="http://schemas.openxmlformats.org/presentationml/2006/main">
+  <p:cSld>
+    <p:spTree>
+      <p:nvGrpSpPr>
+        <p:cNvPr id="1" name=""/>
+        <p:cNvGrpSpPr/>
+        <p:nvPr/>
+      </p:nvGrpSpPr>
+      <p:grpSpPr>
+        <a:xfrm>
+          <a:off x="0" y="0"/>
+          <a:ext cx="0" cy="0"/>
+          <a:chOff x="0" y="0"/>
+          <a:chExt cx="0" cy="0"/>
+        </a:xfrm>
+      </p:grpSpPr>
+      <p:sp>
+        <p:nvSpPr>
+          <p:cNvPr id="2" name="Title 1"/>
+          <p:cNvSpPr>
+            <a:spLocks noGrp="1"/>
+          </p:cNvSpPr>
+          <p:nvPr>
+            <p:ph type="title"/>
+          </p:nvPr>
+        </p:nvSpPr>
+        <p:spPr/>
+        <p:txBody>
+          <a:bodyPr/>
+          <a:lstStyle/>
+          <a:p>
+            <a:r>
+              <a:rPr lang="en-US" dirty="0" smtClean="0"/>
+              <a:t>Screenshots</a:t>
+            </a:r>
+            <a:endParaRPr lang="en-US" dirty="0"/>
+          </a:p>
+        </p:txBody>
+      </p:sp>
+      <p:pic>
+        <p:nvPicPr>
+          <p:cNvPr id="2051" name="Picture 3"/>
+          <p:cNvPicPr>
+            <a:picLocks noGrp="1" noChangeAspect="1" noChangeArrowheads="1"/>
+          </p:cNvPicPr>
+          <p:nvPr>
+            <p:ph idx="1"/>
+          </p:nvPr>
+        </p:nvPicPr>
+        <p:blipFill>
+          <a:blip r:embed="rId2"/>
+          <a:srcRect/>
+          <a:stretch>
+            <a:fillRect/>
+          </a:stretch>
+        </p:blipFill>
+        <p:spPr bwMode="auto">
+          <a:xfrm>
+            <a:off x="3219450" y="2210594"/>
+            <a:ext cx="2705100" cy="3305175"/>
+          </a:xfrm>
+          <a:prstGeom prst="rect">
+            <a:avLst/>
+          </a:prstGeom>
+          <a:noFill/>
+          <a:ln w="9525">
+            <a:noFill/>
+            <a:miter lim="800000"/>
+            <a:headEnd/>
+            <a:tailEnd/>
+          </a:ln>
+          <a:effectLst/>
+        </p:spPr>
+      </p:pic>
+    </p:spTree>
+  </p:cSld>
+  <p:clrMapOvr>
+    <a:masterClrMapping/>
+  </p:clrMapOvr>
+</p:sld>
+</file>
+
 <file path=ppt/slides/slide2.xml><?xml version="1.0" encoding="utf-8"?>
 <p:sld xmlns:a="http://schemas.openxmlformats.org/drawingml/2006/main" xmlns:r="http://schemas.openxmlformats.org/officeDocument/2006/relationships" xmlns:p="http://schemas.openxmlformats.org/presentationml/2006/main">
   <p:cSld>
@@ -3721,6 +3986,119 @@
           <a:effectLst/>
         </p:spPr>
       </p:pic>
+    </p:spTree>
+  </p:cSld>
+  <p:clrMapOvr>
+    <a:masterClrMapping/>
+  </p:clrMapOvr>
+</p:sld>
+</file>
+
+<file path=ppt/slides/slide9.xml><?xml version="1.0" encoding="utf-8"?>
+<p:sld xmlns:a="http://schemas.openxmlformats.org/drawingml/2006/main" xmlns:r="http://schemas.openxmlformats.org/officeDocument/2006/relationships" xmlns:p="http://schemas.openxmlformats.org/presentationml/2006/main">
+  <p:cSld>
+    <p:spTree>
+      <p:nvGrpSpPr>
+        <p:cNvPr id="1" name=""/>
+        <p:cNvGrpSpPr/>
+        <p:nvPr/>
+      </p:nvGrpSpPr>
+      <p:grpSpPr>
+        <a:xfrm>
+          <a:off x="0" y="0"/>
+          <a:ext cx="0" cy="0"/>
+          <a:chOff x="0" y="0"/>
+          <a:chExt cx="0" cy="0"/>
+        </a:xfrm>
+      </p:grpSpPr>
+      <p:sp>
+        <p:nvSpPr>
+          <p:cNvPr id="2" name="Title 1"/>
+          <p:cNvSpPr>
+            <a:spLocks noGrp="1"/>
+          </p:cNvSpPr>
+          <p:nvPr>
+            <p:ph type="title"/>
+          </p:nvPr>
+        </p:nvSpPr>
+        <p:spPr/>
+        <p:txBody>
+          <a:bodyPr/>
+          <a:lstStyle/>
+          <a:p>
+            <a:r>
+              <a:rPr lang="en-US" dirty="0" smtClean="0"/>
+              <a:t>Development – Decoding/Output</a:t>
+            </a:r>
+            <a:endParaRPr lang="en-US" dirty="0"/>
+          </a:p>
+        </p:txBody>
+      </p:sp>
+      <p:sp>
+        <p:nvSpPr>
+          <p:cNvPr id="3" name="Content Placeholder 2"/>
+          <p:cNvSpPr>
+            <a:spLocks noGrp="1"/>
+          </p:cNvSpPr>
+          <p:nvPr>
+            <p:ph idx="1"/>
+          </p:nvPr>
+        </p:nvSpPr>
+        <p:spPr/>
+        <p:txBody>
+          <a:bodyPr/>
+          <a:lstStyle/>
+          <a:p>
+            <a:r>
+              <a:rPr lang="en-US" dirty="0" smtClean="0"/>
+              <a:t>3</a:t>
+            </a:r>
+            <a:r>
+              <a:rPr lang="en-US" baseline="30000" dirty="0" smtClean="0"/>
+              <a:t>rd</a:t>
+            </a:r>
+            <a:r>
+              <a:rPr lang="en-US" dirty="0" smtClean="0"/>
+              <a:t> Party Library – FFMPEG</a:t>
+            </a:r>
+          </a:p>
+          <a:p>
+            <a:pPr lvl="1"/>
+            <a:r>
+              <a:rPr lang="en-US" dirty="0" smtClean="0"/>
+              <a:t>Supports all file formats</a:t>
+            </a:r>
+          </a:p>
+          <a:p>
+            <a:pPr lvl="1"/>
+            <a:r>
+              <a:rPr lang="en-US" dirty="0" smtClean="0"/>
+              <a:t>Provides PCM audio stream</a:t>
+            </a:r>
+          </a:p>
+          <a:p>
+            <a:r>
+              <a:rPr lang="en-US" dirty="0" smtClean="0"/>
+              <a:t>Windows API</a:t>
+            </a:r>
+          </a:p>
+          <a:p>
+            <a:pPr lvl="1"/>
+            <a:r>
+              <a:rPr lang="en-US" dirty="0" smtClean="0"/>
+              <a:t>Waveform Audio Functions</a:t>
+            </a:r>
+          </a:p>
+          <a:p>
+            <a:pPr lvl="1"/>
+            <a:r>
+              <a:rPr lang="en-US" dirty="0" smtClean="0"/>
+              <a:t>Custom Audio Buffers</a:t>
+            </a:r>
+            <a:endParaRPr lang="en-US" dirty="0"/>
+          </a:p>
+        </p:txBody>
+      </p:sp>
     </p:spTree>
   </p:cSld>
   <p:clrMapOvr>

</xml_diff>